<commit_message>
update powerpoint, added graphs in my notebook
</commit_message>
<xml_diff>
--- a/reports/History of Debt During Mordern U.pptx
+++ b/reports/History of Debt During Mordern U.pptx
@@ -7,12 +7,14 @@
   <p:sldIdLst>
     <p:sldId id="256" r:id="rId2"/>
     <p:sldId id="258" r:id="rId3"/>
-    <p:sldId id="259" r:id="rId4"/>
-    <p:sldId id="260" r:id="rId5"/>
+    <p:sldId id="260" r:id="rId4"/>
+    <p:sldId id="265" r:id="rId5"/>
     <p:sldId id="261" r:id="rId6"/>
     <p:sldId id="262" r:id="rId7"/>
-    <p:sldId id="263" r:id="rId8"/>
-    <p:sldId id="264" r:id="rId9"/>
+    <p:sldId id="264" r:id="rId8"/>
+    <p:sldId id="267" r:id="rId9"/>
+    <p:sldId id="266" r:id="rId10"/>
+    <p:sldId id="268" r:id="rId11"/>
   </p:sldIdLst>
   <p:sldSz cx="12192000" cy="6858000"/>
   <p:notesSz cx="6858000" cy="9144000"/>
@@ -145,20 +147,6 @@
   <p:cm authorId="1" dt="2019-01-19T00:35:45.220" idx="3">
     <p:pos x="106" y="106"/>
     <p:text>Point out the recessions and explain why we picked this time series.</p:text>
-    <p:extLst>
-      <p:ext uri="{C676402C-5697-4E1C-873F-D02D1690AC5C}">
-        <p15:threadingInfo xmlns:p15="http://schemas.microsoft.com/office/powerpoint/2012/main" timeZoneBias="360"/>
-      </p:ext>
-    </p:extLst>
-  </p:cm>
-</p:cmLst>
-</file>
-
-<file path=ppt/comments/comment2.xml><?xml version="1.0" encoding="utf-8"?>
-<p:cmLst xmlns:a="http://schemas.openxmlformats.org/drawingml/2006/main" xmlns:r="http://schemas.openxmlformats.org/officeDocument/2006/relationships" xmlns:p="http://schemas.openxmlformats.org/presentationml/2006/main">
-  <p:cm authorId="1" dt="2019-01-19T00:34:36.502" idx="1">
-    <p:pos x="10" y="10"/>
-    <p:text>Explain what each loan type is</p:text>
     <p:extLst>
       <p:ext uri="{C676402C-5697-4E1C-873F-D02D1690AC5C}">
         <p15:threadingInfo xmlns:p15="http://schemas.microsoft.com/office/powerpoint/2012/main" timeZoneBias="360"/>
@@ -3436,6 +3424,36 @@
 </p:sld>
 </file>
 
+<file path=ppt/slides/slide10.xml><?xml version="1.0" encoding="utf-8"?>
+<p:sld xmlns:a="http://schemas.openxmlformats.org/drawingml/2006/main" xmlns:r="http://schemas.openxmlformats.org/officeDocument/2006/relationships" xmlns:p="http://schemas.openxmlformats.org/presentationml/2006/main">
+  <p:cSld>
+    <p:spTree>
+      <p:nvGrpSpPr>
+        <p:cNvPr id="1" name=""/>
+        <p:cNvGrpSpPr/>
+        <p:nvPr/>
+      </p:nvGrpSpPr>
+      <p:grpSpPr>
+        <a:xfrm>
+          <a:off x="0" y="0"/>
+          <a:ext cx="0" cy="0"/>
+          <a:chOff x="0" y="0"/>
+          <a:chExt cx="0" cy="0"/>
+        </a:xfrm>
+      </p:grpSpPr>
+    </p:spTree>
+    <p:extLst>
+      <p:ext uri="{BB962C8B-B14F-4D97-AF65-F5344CB8AC3E}">
+        <p14:creationId xmlns:p14="http://schemas.microsoft.com/office/powerpoint/2010/main" val="2087762711"/>
+      </p:ext>
+    </p:extLst>
+  </p:cSld>
+  <p:clrMapOvr>
+    <a:masterClrMapping/>
+  </p:clrMapOvr>
+</p:sld>
+</file>
+
 <file path=ppt/slides/slide2.xml><?xml version="1.0" encoding="utf-8"?>
 <p:sld xmlns:a="http://schemas.openxmlformats.org/drawingml/2006/main" xmlns:r="http://schemas.openxmlformats.org/officeDocument/2006/relationships" xmlns:p="http://schemas.openxmlformats.org/presentationml/2006/main">
   <p:cSld>
@@ -3668,7 +3686,7 @@
       </p:grpSpPr>
       <p:sp>
         <p:nvSpPr>
-          <p:cNvPr id="12" name="Rectangle 7">
+          <p:cNvPr id="8" name="Rectangle 7">
             <a:extLst>
               <a:ext uri="{FF2B5EF4-FFF2-40B4-BE49-F238E27FC236}">
                 <a16:creationId xmlns:a16="http://schemas.microsoft.com/office/drawing/2014/main" id="{32BC26D8-82FB-445E-AA49-62A77D7C1EE0}"/>
@@ -3734,7 +3752,7 @@
       </p:sp>
       <p:sp>
         <p:nvSpPr>
-          <p:cNvPr id="13" name="Rectangle 9">
+          <p:cNvPr id="10" name="Rectangle 9">
             <a:extLst>
               <a:ext uri="{FF2B5EF4-FFF2-40B4-BE49-F238E27FC236}">
                 <a16:creationId xmlns:a16="http://schemas.microsoft.com/office/drawing/2014/main" id="{CB44330D-EA18-4254-AA95-EB49948539B8}"/>
@@ -3800,7 +3818,7 @@
           <p:cNvPr id="3" name="Picture 2" descr="A screenshot of a cell phone&#10;&#10;Description automatically generated">
             <a:extLst>
               <a:ext uri="{FF2B5EF4-FFF2-40B4-BE49-F238E27FC236}">
-                <a16:creationId xmlns:a16="http://schemas.microsoft.com/office/drawing/2014/main" id="{3FBA277C-53E9-4244-BF3E-D8343B10A24A}"/>
+                <a16:creationId xmlns:a16="http://schemas.microsoft.com/office/drawing/2014/main" id="{2128889E-8477-4AC5-B7F1-BF7176E04BFD}"/>
               </a:ext>
             </a:extLst>
           </p:cNvPr>
@@ -3834,7 +3852,7 @@
     </p:spTree>
     <p:extLst>
       <p:ext uri="{BB962C8B-B14F-4D97-AF65-F5344CB8AC3E}">
-        <p14:creationId xmlns:p14="http://schemas.microsoft.com/office/powerpoint/2010/main" val="781959841"/>
+        <p14:creationId xmlns:p14="http://schemas.microsoft.com/office/powerpoint/2010/main" val="1023361543"/>
       </p:ext>
     </p:extLst>
   </p:cSld>
@@ -3871,7 +3889,7 @@
       </p:grpSpPr>
       <p:sp>
         <p:nvSpPr>
-          <p:cNvPr id="8" name="Rectangle 7">
+          <p:cNvPr id="17" name="Rectangle 16">
             <a:extLst>
               <a:ext uri="{FF2B5EF4-FFF2-40B4-BE49-F238E27FC236}">
                 <a16:creationId xmlns:a16="http://schemas.microsoft.com/office/drawing/2014/main" id="{32BC26D8-82FB-445E-AA49-62A77D7C1EE0}"/>
@@ -3937,7 +3955,7 @@
       </p:sp>
       <p:sp>
         <p:nvSpPr>
-          <p:cNvPr id="10" name="Rectangle 9">
+          <p:cNvPr id="19" name="Rectangle 18">
             <a:extLst>
               <a:ext uri="{FF2B5EF4-FFF2-40B4-BE49-F238E27FC236}">
                 <a16:creationId xmlns:a16="http://schemas.microsoft.com/office/drawing/2014/main" id="{CB44330D-EA18-4254-AA95-EB49948539B8}"/>
@@ -4000,10 +4018,10 @@
       </p:sp>
       <p:pic>
         <p:nvPicPr>
-          <p:cNvPr id="3" name="Picture 2" descr="A screenshot of a cell phone&#10;&#10;Description automatically generated">
-            <a:extLst>
-              <a:ext uri="{FF2B5EF4-FFF2-40B4-BE49-F238E27FC236}">
-                <a16:creationId xmlns:a16="http://schemas.microsoft.com/office/drawing/2014/main" id="{2128889E-8477-4AC5-B7F1-BF7176E04BFD}"/>
+          <p:cNvPr id="7" name="Picture 6">
+            <a:extLst>
+              <a:ext uri="{FF2B5EF4-FFF2-40B4-BE49-F238E27FC236}">
+                <a16:creationId xmlns:a16="http://schemas.microsoft.com/office/drawing/2014/main" id="{B3D2A727-1B09-4EDD-B5C2-5D2AE0FC82C6}"/>
               </a:ext>
             </a:extLst>
           </p:cNvPr>
@@ -4037,7 +4055,7 @@
     </p:spTree>
     <p:extLst>
       <p:ext uri="{BB962C8B-B14F-4D97-AF65-F5344CB8AC3E}">
-        <p14:creationId xmlns:p14="http://schemas.microsoft.com/office/powerpoint/2010/main" val="1023361543"/>
+        <p14:creationId xmlns:p14="http://schemas.microsoft.com/office/powerpoint/2010/main" val="759667663"/>
       </p:ext>
     </p:extLst>
   </p:cSld>
@@ -4203,10 +4221,10 @@
       </p:sp>
       <p:pic>
         <p:nvPicPr>
-          <p:cNvPr id="3" name="Picture 2" descr="A screenshot of a cell phone&#10;&#10;Description automatically generated">
-            <a:extLst>
-              <a:ext uri="{FF2B5EF4-FFF2-40B4-BE49-F238E27FC236}">
-                <a16:creationId xmlns:a16="http://schemas.microsoft.com/office/drawing/2014/main" id="{B0BBFD45-5953-4D1E-BC37-4BDB7B16555B}"/>
+          <p:cNvPr id="4" name="Picture 3" descr="A screenshot of a cell phone&#10;&#10;Description automatically generated">
+            <a:extLst>
+              <a:ext uri="{FF2B5EF4-FFF2-40B4-BE49-F238E27FC236}">
+                <a16:creationId xmlns:a16="http://schemas.microsoft.com/office/drawing/2014/main" id="{7F21FB3F-BCA5-4653-88A3-5A14FCE066E3}"/>
               </a:ext>
             </a:extLst>
           </p:cNvPr>
@@ -4229,8 +4247,8 @@
         </p:blipFill>
         <p:spPr>
           <a:xfrm>
-            <a:off x="1917700" y="643467"/>
-            <a:ext cx="8356599" cy="5571066"/>
+            <a:off x="3352175" y="1599783"/>
+            <a:ext cx="5487650" cy="3658433"/>
           </a:xfrm>
           <a:prstGeom prst="rect">
             <a:avLst/>
@@ -4406,10 +4424,10 @@
       </p:sp>
       <p:pic>
         <p:nvPicPr>
-          <p:cNvPr id="3" name="Picture 2" descr="A screenshot of a cell phone&#10;&#10;Description automatically generated">
-            <a:extLst>
-              <a:ext uri="{FF2B5EF4-FFF2-40B4-BE49-F238E27FC236}">
-                <a16:creationId xmlns:a16="http://schemas.microsoft.com/office/drawing/2014/main" id="{F41E55AA-5B2A-4D7F-AEE6-8367A6870079}"/>
+          <p:cNvPr id="4" name="Picture 3" descr="A screenshot of a cell phone&#10;&#10;Description automatically generated">
+            <a:extLst>
+              <a:ext uri="{FF2B5EF4-FFF2-40B4-BE49-F238E27FC236}">
+                <a16:creationId xmlns:a16="http://schemas.microsoft.com/office/drawing/2014/main" id="{A6BEC23C-7C11-49E6-B6B7-03344BD02C1C}"/>
               </a:ext>
             </a:extLst>
           </p:cNvPr>
@@ -4432,8 +4450,8 @@
         </p:blipFill>
         <p:spPr>
           <a:xfrm>
-            <a:off x="1917700" y="643467"/>
-            <a:ext cx="8356599" cy="5571066"/>
+            <a:off x="3352175" y="1599783"/>
+            <a:ext cx="5487650" cy="3658433"/>
           </a:xfrm>
           <a:prstGeom prst="rect">
             <a:avLst/>
@@ -4480,7 +4498,7 @@
       </p:grpSpPr>
       <p:sp>
         <p:nvSpPr>
-          <p:cNvPr id="8" name="Rectangle 7">
+          <p:cNvPr id="15" name="Rectangle 7">
             <a:extLst>
               <a:ext uri="{FF2B5EF4-FFF2-40B4-BE49-F238E27FC236}">
                 <a16:creationId xmlns:a16="http://schemas.microsoft.com/office/drawing/2014/main" id="{32BC26D8-82FB-445E-AA49-62A77D7C1EE0}"/>
@@ -4612,7 +4630,7 @@
           <p:cNvPr id="3" name="Picture 2" descr="A screenshot of a cell phone&#10;&#10;Description automatically generated">
             <a:extLst>
               <a:ext uri="{FF2B5EF4-FFF2-40B4-BE49-F238E27FC236}">
-                <a16:creationId xmlns:a16="http://schemas.microsoft.com/office/drawing/2014/main" id="{9D1CC6A0-D045-4058-B6C3-2952EBBB6FAF}"/>
+                <a16:creationId xmlns:a16="http://schemas.microsoft.com/office/drawing/2014/main" id="{82F29655-240E-4AFE-B3C7-33604A3C3E84}"/>
               </a:ext>
             </a:extLst>
           </p:cNvPr>
@@ -4646,7 +4664,7 @@
     </p:spTree>
     <p:extLst>
       <p:ext uri="{BB962C8B-B14F-4D97-AF65-F5344CB8AC3E}">
-        <p14:creationId xmlns:p14="http://schemas.microsoft.com/office/powerpoint/2010/main" val="3677541447"/>
+        <p14:creationId xmlns:p14="http://schemas.microsoft.com/office/powerpoint/2010/main" val="1843806652"/>
       </p:ext>
     </p:extLst>
   </p:cSld>
@@ -4659,6 +4677,14 @@
 <file path=ppt/slides/slide8.xml><?xml version="1.0" encoding="utf-8"?>
 <p:sld xmlns:a="http://schemas.openxmlformats.org/drawingml/2006/main" xmlns:r="http://schemas.openxmlformats.org/officeDocument/2006/relationships" xmlns:p="http://schemas.openxmlformats.org/presentationml/2006/main">
   <p:cSld>
+    <p:bg>
+      <p:bgPr>
+        <a:solidFill>
+          <a:schemeClr val="bg1"/>
+        </a:solidFill>
+        <a:effectLst/>
+      </p:bgPr>
+    </p:bg>
     <p:spTree>
       <p:nvGrpSpPr>
         <p:cNvPr id="1" name=""/>
@@ -4673,10 +4699,342 @@
           <a:chExt cx="0" cy="0"/>
         </a:xfrm>
       </p:grpSpPr>
+      <p:sp>
+        <p:nvSpPr>
+          <p:cNvPr id="8" name="Rectangle 7">
+            <a:extLst>
+              <a:ext uri="{FF2B5EF4-FFF2-40B4-BE49-F238E27FC236}">
+                <a16:creationId xmlns:a16="http://schemas.microsoft.com/office/drawing/2014/main" id="{32BC26D8-82FB-445E-AA49-62A77D7C1EE0}"/>
+              </a:ext>
+              <a:ext uri="{C183D7F6-B498-43B3-948B-1728B52AA6E4}">
+                <adec:decorative xmlns:adec="http://schemas.microsoft.com/office/drawing/2017/decorative" val="1"/>
+              </a:ext>
+            </a:extLst>
+          </p:cNvPr>
+          <p:cNvSpPr>
+            <a:spLocks noGrp="1" noRot="1" noChangeAspect="1" noMove="1" noResize="1" noEditPoints="1" noAdjustHandles="1" noChangeArrowheads="1" noChangeShapeType="1" noTextEdit="1"/>
+          </p:cNvSpPr>
+          <p:nvPr>
+            <p:extLst>
+              <p:ext uri="{386F3935-93C4-4BCD-93E2-E3B085C9AB24}">
+                <p16:designElem xmlns:p16="http://schemas.microsoft.com/office/powerpoint/2015/main" val="1"/>
+              </p:ext>
+            </p:extLst>
+          </p:nvPr>
+        </p:nvSpPr>
+        <p:spPr>
+          <a:xfrm>
+            <a:off x="0" y="0"/>
+            <a:ext cx="12192000" cy="6858000"/>
+          </a:xfrm>
+          <a:prstGeom prst="rect">
+            <a:avLst/>
+          </a:prstGeom>
+          <a:solidFill>
+            <a:schemeClr val="tx1">
+              <a:lumMod val="65000"/>
+              <a:lumOff val="35000"/>
+            </a:schemeClr>
+          </a:solidFill>
+          <a:ln>
+            <a:noFill/>
+          </a:ln>
+        </p:spPr>
+        <p:style>
+          <a:lnRef idx="2">
+            <a:schemeClr val="accent1">
+              <a:shade val="50000"/>
+            </a:schemeClr>
+          </a:lnRef>
+          <a:fillRef idx="1">
+            <a:schemeClr val="accent1"/>
+          </a:fillRef>
+          <a:effectRef idx="0">
+            <a:schemeClr val="accent1"/>
+          </a:effectRef>
+          <a:fontRef idx="minor">
+            <a:schemeClr val="lt1"/>
+          </a:fontRef>
+        </p:style>
+        <p:txBody>
+          <a:bodyPr rtlCol="0" anchor="ctr"/>
+          <a:lstStyle/>
+          <a:p>
+            <a:pPr algn="ctr"/>
+            <a:endParaRPr lang="en-US"/>
+          </a:p>
+        </p:txBody>
+      </p:sp>
+      <p:sp>
+        <p:nvSpPr>
+          <p:cNvPr id="10" name="Rectangle 9">
+            <a:extLst>
+              <a:ext uri="{FF2B5EF4-FFF2-40B4-BE49-F238E27FC236}">
+                <a16:creationId xmlns:a16="http://schemas.microsoft.com/office/drawing/2014/main" id="{CB44330D-EA18-4254-AA95-EB49948539B8}"/>
+              </a:ext>
+              <a:ext uri="{C183D7F6-B498-43B3-948B-1728B52AA6E4}">
+                <adec:decorative xmlns:adec="http://schemas.microsoft.com/office/drawing/2017/decorative" val="1"/>
+              </a:ext>
+            </a:extLst>
+          </p:cNvPr>
+          <p:cNvSpPr>
+            <a:spLocks noGrp="1" noRot="1" noChangeAspect="1" noMove="1" noResize="1" noEditPoints="1" noAdjustHandles="1" noChangeArrowheads="1" noChangeShapeType="1" noTextEdit="1"/>
+          </p:cNvSpPr>
+          <p:nvPr>
+            <p:extLst>
+              <p:ext uri="{386F3935-93C4-4BCD-93E2-E3B085C9AB24}">
+                <p16:designElem xmlns:p16="http://schemas.microsoft.com/office/powerpoint/2015/main" val="1"/>
+              </p:ext>
+            </p:extLst>
+          </p:nvPr>
+        </p:nvSpPr>
+        <p:spPr>
+          <a:xfrm>
+            <a:off x="477012" y="480060"/>
+            <a:ext cx="11237976" cy="5897880"/>
+          </a:xfrm>
+          <a:prstGeom prst="rect">
+            <a:avLst/>
+          </a:prstGeom>
+          <a:solidFill>
+            <a:srgbClr val="FFFFFF"/>
+          </a:solidFill>
+          <a:ln>
+            <a:noFill/>
+          </a:ln>
+        </p:spPr>
+        <p:style>
+          <a:lnRef idx="2">
+            <a:schemeClr val="accent1">
+              <a:shade val="50000"/>
+            </a:schemeClr>
+          </a:lnRef>
+          <a:fillRef idx="1">
+            <a:schemeClr val="accent1"/>
+          </a:fillRef>
+          <a:effectRef idx="0">
+            <a:schemeClr val="accent1"/>
+          </a:effectRef>
+          <a:fontRef idx="minor">
+            <a:schemeClr val="lt1"/>
+          </a:fontRef>
+        </p:style>
+        <p:txBody>
+          <a:bodyPr rtlCol="0" anchor="ctr"/>
+          <a:lstStyle/>
+          <a:p>
+            <a:pPr algn="ctr"/>
+            <a:endParaRPr lang="en-US"/>
+          </a:p>
+        </p:txBody>
+      </p:sp>
+      <p:pic>
+        <p:nvPicPr>
+          <p:cNvPr id="3" name="Picture 2" descr="A screenshot of a cell phone&#10;&#10;Description automatically generated">
+            <a:extLst>
+              <a:ext uri="{FF2B5EF4-FFF2-40B4-BE49-F238E27FC236}">
+                <a16:creationId xmlns:a16="http://schemas.microsoft.com/office/drawing/2014/main" id="{4D4679AA-0BAA-4555-9CA3-885CACA5B4B7}"/>
+              </a:ext>
+            </a:extLst>
+          </p:cNvPr>
+          <p:cNvPicPr>
+            <a:picLocks noChangeAspect="1"/>
+          </p:cNvPicPr>
+          <p:nvPr/>
+        </p:nvPicPr>
+        <p:blipFill>
+          <a:blip r:embed="rId2">
+            <a:extLst>
+              <a:ext uri="{28A0092B-C50C-407E-A947-70E740481C1C}">
+                <a14:useLocalDpi xmlns:a14="http://schemas.microsoft.com/office/drawing/2010/main" val="0"/>
+              </a:ext>
+            </a:extLst>
+          </a:blip>
+          <a:stretch>
+            <a:fillRect/>
+          </a:stretch>
+        </p:blipFill>
+        <p:spPr>
+          <a:xfrm>
+            <a:off x="1917700" y="643467"/>
+            <a:ext cx="8356599" cy="5571066"/>
+          </a:xfrm>
+          <a:prstGeom prst="rect">
+            <a:avLst/>
+          </a:prstGeom>
+        </p:spPr>
+      </p:pic>
     </p:spTree>
     <p:extLst>
       <p:ext uri="{BB962C8B-B14F-4D97-AF65-F5344CB8AC3E}">
-        <p14:creationId xmlns:p14="http://schemas.microsoft.com/office/powerpoint/2010/main" val="1843806652"/>
+        <p14:creationId xmlns:p14="http://schemas.microsoft.com/office/powerpoint/2010/main" val="1547529740"/>
+      </p:ext>
+    </p:extLst>
+  </p:cSld>
+  <p:clrMapOvr>
+    <a:masterClrMapping/>
+  </p:clrMapOvr>
+</p:sld>
+</file>
+
+<file path=ppt/slides/slide9.xml><?xml version="1.0" encoding="utf-8"?>
+<p:sld xmlns:a="http://schemas.openxmlformats.org/drawingml/2006/main" xmlns:r="http://schemas.openxmlformats.org/officeDocument/2006/relationships" xmlns:p="http://schemas.openxmlformats.org/presentationml/2006/main">
+  <p:cSld>
+    <p:bg>
+      <p:bgPr>
+        <a:solidFill>
+          <a:schemeClr val="bg1"/>
+        </a:solidFill>
+        <a:effectLst/>
+      </p:bgPr>
+    </p:bg>
+    <p:spTree>
+      <p:nvGrpSpPr>
+        <p:cNvPr id="1" name=""/>
+        <p:cNvGrpSpPr/>
+        <p:nvPr/>
+      </p:nvGrpSpPr>
+      <p:grpSpPr>
+        <a:xfrm>
+          <a:off x="0" y="0"/>
+          <a:ext cx="0" cy="0"/>
+          <a:chOff x="0" y="0"/>
+          <a:chExt cx="0" cy="0"/>
+        </a:xfrm>
+      </p:grpSpPr>
+      <p:sp>
+        <p:nvSpPr>
+          <p:cNvPr id="8" name="Rectangle 7">
+            <a:extLst>
+              <a:ext uri="{FF2B5EF4-FFF2-40B4-BE49-F238E27FC236}">
+                <a16:creationId xmlns:a16="http://schemas.microsoft.com/office/drawing/2014/main" id="{32BC26D8-82FB-445E-AA49-62A77D7C1EE0}"/>
+              </a:ext>
+              <a:ext uri="{C183D7F6-B498-43B3-948B-1728B52AA6E4}">
+                <adec:decorative xmlns:adec="http://schemas.microsoft.com/office/drawing/2017/decorative" val="1"/>
+              </a:ext>
+            </a:extLst>
+          </p:cNvPr>
+          <p:cNvSpPr>
+            <a:spLocks noGrp="1" noRot="1" noChangeAspect="1" noMove="1" noResize="1" noEditPoints="1" noAdjustHandles="1" noChangeArrowheads="1" noChangeShapeType="1" noTextEdit="1"/>
+          </p:cNvSpPr>
+          <p:nvPr>
+            <p:extLst>
+              <p:ext uri="{386F3935-93C4-4BCD-93E2-E3B085C9AB24}">
+                <p16:designElem xmlns:p16="http://schemas.microsoft.com/office/powerpoint/2015/main" val="1"/>
+              </p:ext>
+            </p:extLst>
+          </p:nvPr>
+        </p:nvSpPr>
+        <p:spPr>
+          <a:xfrm>
+            <a:off x="0" y="0"/>
+            <a:ext cx="12192000" cy="6858000"/>
+          </a:xfrm>
+          <a:prstGeom prst="rect">
+            <a:avLst/>
+          </a:prstGeom>
+          <a:solidFill>
+            <a:schemeClr val="tx1">
+              <a:lumMod val="65000"/>
+              <a:lumOff val="35000"/>
+            </a:schemeClr>
+          </a:solidFill>
+          <a:ln>
+            <a:noFill/>
+          </a:ln>
+        </p:spPr>
+        <p:style>
+          <a:lnRef idx="2">
+            <a:schemeClr val="accent1">
+              <a:shade val="50000"/>
+            </a:schemeClr>
+          </a:lnRef>
+          <a:fillRef idx="1">
+            <a:schemeClr val="accent1"/>
+          </a:fillRef>
+          <a:effectRef idx="0">
+            <a:schemeClr val="accent1"/>
+          </a:effectRef>
+          <a:fontRef idx="minor">
+            <a:schemeClr val="lt1"/>
+          </a:fontRef>
+        </p:style>
+        <p:txBody>
+          <a:bodyPr rtlCol="0" anchor="ctr"/>
+          <a:lstStyle/>
+          <a:p>
+            <a:pPr algn="ctr"/>
+            <a:endParaRPr lang="en-US"/>
+          </a:p>
+        </p:txBody>
+      </p:sp>
+      <p:sp>
+        <p:nvSpPr>
+          <p:cNvPr id="10" name="Rectangle 9">
+            <a:extLst>
+              <a:ext uri="{FF2B5EF4-FFF2-40B4-BE49-F238E27FC236}">
+                <a16:creationId xmlns:a16="http://schemas.microsoft.com/office/drawing/2014/main" id="{CB44330D-EA18-4254-AA95-EB49948539B8}"/>
+              </a:ext>
+              <a:ext uri="{C183D7F6-B498-43B3-948B-1728B52AA6E4}">
+                <adec:decorative xmlns:adec="http://schemas.microsoft.com/office/drawing/2017/decorative" val="1"/>
+              </a:ext>
+            </a:extLst>
+          </p:cNvPr>
+          <p:cNvSpPr>
+            <a:spLocks noGrp="1" noRot="1" noChangeAspect="1" noMove="1" noResize="1" noEditPoints="1" noAdjustHandles="1" noChangeArrowheads="1" noChangeShapeType="1" noTextEdit="1"/>
+          </p:cNvSpPr>
+          <p:nvPr>
+            <p:extLst>
+              <p:ext uri="{386F3935-93C4-4BCD-93E2-E3B085C9AB24}">
+                <p16:designElem xmlns:p16="http://schemas.microsoft.com/office/powerpoint/2015/main" val="1"/>
+              </p:ext>
+            </p:extLst>
+          </p:nvPr>
+        </p:nvSpPr>
+        <p:spPr>
+          <a:xfrm>
+            <a:off x="477012" y="480060"/>
+            <a:ext cx="11237976" cy="5897880"/>
+          </a:xfrm>
+          <a:prstGeom prst="rect">
+            <a:avLst/>
+          </a:prstGeom>
+          <a:solidFill>
+            <a:srgbClr val="FFFFFF"/>
+          </a:solidFill>
+          <a:ln>
+            <a:noFill/>
+          </a:ln>
+        </p:spPr>
+        <p:style>
+          <a:lnRef idx="2">
+            <a:schemeClr val="accent1">
+              <a:shade val="50000"/>
+            </a:schemeClr>
+          </a:lnRef>
+          <a:fillRef idx="1">
+            <a:schemeClr val="accent1"/>
+          </a:fillRef>
+          <a:effectRef idx="0">
+            <a:schemeClr val="accent1"/>
+          </a:effectRef>
+          <a:fontRef idx="minor">
+            <a:schemeClr val="lt1"/>
+          </a:fontRef>
+        </p:style>
+        <p:txBody>
+          <a:bodyPr rtlCol="0" anchor="ctr"/>
+          <a:lstStyle/>
+          <a:p>
+            <a:pPr algn="ctr"/>
+            <a:endParaRPr lang="en-US"/>
+          </a:p>
+        </p:txBody>
+      </p:sp>
+    </p:spTree>
+    <p:extLst>
+      <p:ext uri="{BB962C8B-B14F-4D97-AF65-F5344CB8AC3E}">
+        <p14:creationId xmlns:p14="http://schemas.microsoft.com/office/powerpoint/2010/main" val="2299558052"/>
       </p:ext>
     </p:extLst>
   </p:cSld>

</xml_diff>